<commit_message>
Fix to remove link
</commit_message>
<xml_diff>
--- a/lectures/DJ-02-MVC.pptx
+++ b/lectures/DJ-02-MVC.pptx
@@ -3466,10 +3466,10 @@
           <p:cNvPr id="10" name="Rectangle 9">
             <a:extLst>
               <a:ext uri="{FF2B5EF4-FFF2-40B4-BE49-F238E27FC236}">
-                <a16:creationId xmlns="" xmlns:a16="http://schemas.microsoft.com/office/drawing/2014/main" id="{E20EB187-900F-4AF5-813B-101456D9FD39}"/>
+                <a16:creationId xmlns:a16="http://schemas.microsoft.com/office/drawing/2014/main" xmlns="" id="{E20EB187-900F-4AF5-813B-101456D9FD39}"/>
               </a:ext>
               <a:ext uri="{C183D7F6-B498-43B3-948B-1728B52AA6E4}">
-                <adec:decorative xmlns="" xmlns:adec="http://schemas.microsoft.com/office/drawing/2017/decorative" val="1"/>
+                <adec:decorative xmlns:adec="http://schemas.microsoft.com/office/drawing/2017/decorative" xmlns="" val="1"/>
               </a:ext>
             </a:extLst>
           </p:cNvPr>
@@ -3643,10 +3643,10 @@
           <p:cNvPr id="12" name="Straight Connector 11">
             <a:extLst>
               <a:ext uri="{FF2B5EF4-FFF2-40B4-BE49-F238E27FC236}">
-                <a16:creationId xmlns="" xmlns:a16="http://schemas.microsoft.com/office/drawing/2014/main" id="{624D17C8-E9C2-48A4-AA36-D7048A6CCC41}"/>
+                <a16:creationId xmlns:a16="http://schemas.microsoft.com/office/drawing/2014/main" xmlns="" id="{624D17C8-E9C2-48A4-AA36-D7048A6CCC41}"/>
               </a:ext>
               <a:ext uri="{C183D7F6-B498-43B3-948B-1728B52AA6E4}">
-                <adec:decorative xmlns="" xmlns:adec="http://schemas.microsoft.com/office/drawing/2017/decorative" val="1"/>
+                <adec:decorative xmlns:adec="http://schemas.microsoft.com/office/drawing/2017/decorative" xmlns="" val="1"/>
               </a:ext>
             </a:extLst>
           </p:cNvPr>
@@ -3754,6 +3754,13 @@
   <p:clrMapOvr>
     <a:masterClrMapping/>
   </p:clrMapOvr>
+  <p:timing>
+    <p:tnLst>
+      <p:par>
+        <p:cTn id="1" dur="indefinite" restart="never" nodeType="tmRoot"/>
+      </p:par>
+    </p:tnLst>
+  </p:timing>
 </p:sld>
 </file>
 
@@ -4655,6 +4662,13 @@
   <p:clrMapOvr>
     <a:masterClrMapping/>
   </p:clrMapOvr>
+  <p:timing>
+    <p:tnLst>
+      <p:par>
+        <p:cTn id="1" dur="indefinite" restart="never" nodeType="tmRoot"/>
+      </p:par>
+    </p:tnLst>
+  </p:timing>
 </p:sld>
 </file>
 

</xml_diff>